<commit_message>
TW edits to guide
</commit_message>
<xml_diff>
--- a/guide/content/images/architecture.pptx
+++ b/guide/content/images/architecture.pptx
@@ -197,7 +197,7 @@
           <a:p>
             <a:fld id="{B96B81F7-477F-9A4D-AB92-5C12F9ABB1F1}" type="datetimeFigureOut">
               <a:rPr lang="en-US" smtClean="0"/>
-              <a:t>9/25/23</a:t>
+              <a:t>11/20/2023</a:t>
             </a:fld>
             <a:endParaRPr lang="en-US"/>
           </a:p>
@@ -695,7 +695,7 @@
           <a:p>
             <a:fld id="{700BCB1E-B2FD-D640-A5A6-6E3A11FE191C}" type="datetimeFigureOut">
               <a:rPr lang="en-US" smtClean="0"/>
-              <a:t>9/25/23</a:t>
+              <a:t>11/20/2023</a:t>
             </a:fld>
             <a:endParaRPr lang="en-US"/>
           </a:p>
@@ -893,7 +893,7 @@
           <a:p>
             <a:fld id="{700BCB1E-B2FD-D640-A5A6-6E3A11FE191C}" type="datetimeFigureOut">
               <a:rPr lang="en-US" smtClean="0"/>
-              <a:t>9/25/23</a:t>
+              <a:t>11/20/2023</a:t>
             </a:fld>
             <a:endParaRPr lang="en-US"/>
           </a:p>
@@ -1101,7 +1101,7 @@
           <a:p>
             <a:fld id="{700BCB1E-B2FD-D640-A5A6-6E3A11FE191C}" type="datetimeFigureOut">
               <a:rPr lang="en-US" smtClean="0"/>
-              <a:t>9/25/23</a:t>
+              <a:t>11/20/2023</a:t>
             </a:fld>
             <a:endParaRPr lang="en-US"/>
           </a:p>
@@ -1299,7 +1299,7 @@
           <a:p>
             <a:fld id="{700BCB1E-B2FD-D640-A5A6-6E3A11FE191C}" type="datetimeFigureOut">
               <a:rPr lang="en-US" smtClean="0"/>
-              <a:t>9/25/23</a:t>
+              <a:t>11/20/2023</a:t>
             </a:fld>
             <a:endParaRPr lang="en-US"/>
           </a:p>
@@ -1574,7 +1574,7 @@
           <a:p>
             <a:fld id="{700BCB1E-B2FD-D640-A5A6-6E3A11FE191C}" type="datetimeFigureOut">
               <a:rPr lang="en-US" smtClean="0"/>
-              <a:t>9/25/23</a:t>
+              <a:t>11/20/2023</a:t>
             </a:fld>
             <a:endParaRPr lang="en-US"/>
           </a:p>
@@ -1839,7 +1839,7 @@
           <a:p>
             <a:fld id="{700BCB1E-B2FD-D640-A5A6-6E3A11FE191C}" type="datetimeFigureOut">
               <a:rPr lang="en-US" smtClean="0"/>
-              <a:t>9/25/23</a:t>
+              <a:t>11/20/2023</a:t>
             </a:fld>
             <a:endParaRPr lang="en-US"/>
           </a:p>
@@ -2251,7 +2251,7 @@
           <a:p>
             <a:fld id="{700BCB1E-B2FD-D640-A5A6-6E3A11FE191C}" type="datetimeFigureOut">
               <a:rPr lang="en-US" smtClean="0"/>
-              <a:t>9/25/23</a:t>
+              <a:t>11/20/2023</a:t>
             </a:fld>
             <a:endParaRPr lang="en-US"/>
           </a:p>
@@ -2392,7 +2392,7 @@
           <a:p>
             <a:fld id="{700BCB1E-B2FD-D640-A5A6-6E3A11FE191C}" type="datetimeFigureOut">
               <a:rPr lang="en-US" smtClean="0"/>
-              <a:t>9/25/23</a:t>
+              <a:t>11/20/2023</a:t>
             </a:fld>
             <a:endParaRPr lang="en-US"/>
           </a:p>
@@ -2505,7 +2505,7 @@
           <a:p>
             <a:fld id="{700BCB1E-B2FD-D640-A5A6-6E3A11FE191C}" type="datetimeFigureOut">
               <a:rPr lang="en-US" smtClean="0"/>
-              <a:t>9/25/23</a:t>
+              <a:t>11/20/2023</a:t>
             </a:fld>
             <a:endParaRPr lang="en-US"/>
           </a:p>
@@ -2816,7 +2816,7 @@
           <a:p>
             <a:fld id="{700BCB1E-B2FD-D640-A5A6-6E3A11FE191C}" type="datetimeFigureOut">
               <a:rPr lang="en-US" smtClean="0"/>
-              <a:t>9/25/23</a:t>
+              <a:t>11/20/2023</a:t>
             </a:fld>
             <a:endParaRPr lang="en-US"/>
           </a:p>
@@ -3104,7 +3104,7 @@
           <a:p>
             <a:fld id="{700BCB1E-B2FD-D640-A5A6-6E3A11FE191C}" type="datetimeFigureOut">
               <a:rPr lang="en-US" smtClean="0"/>
-              <a:t>9/25/23</a:t>
+              <a:t>11/20/2023</a:t>
             </a:fld>
             <a:endParaRPr lang="en-US"/>
           </a:p>
@@ -3345,7 +3345,7 @@
           <a:p>
             <a:fld id="{700BCB1E-B2FD-D640-A5A6-6E3A11FE191C}" type="datetimeFigureOut">
               <a:rPr lang="en-US" smtClean="0"/>
-              <a:t>9/25/23</a:t>
+              <a:t>11/20/2023</a:t>
             </a:fld>
             <a:endParaRPr lang="en-US"/>
           </a:p>
@@ -4102,7 +4102,7 @@
                   <a:latin typeface="Arial" panose="020B0604020202020204" pitchFamily="34" charset="0"/>
                   <a:cs typeface="Arial" panose="020B0604020202020204" pitchFamily="34" charset="0"/>
                 </a:rPr>
-                <a:t>Audit Account</a:t>
+                <a:t>Audit account</a:t>
               </a:r>
             </a:p>
           </p:txBody>
@@ -4297,7 +4297,7 @@
                   <a:latin typeface="Arial" panose="020B0604020202020204" pitchFamily="34" charset="0"/>
                   <a:cs typeface="Arial" panose="020B0604020202020204" pitchFamily="34" charset="0"/>
                 </a:rPr>
-                <a:t>Management Account</a:t>
+                <a:t>Management account</a:t>
               </a:r>
             </a:p>
           </p:txBody>
@@ -4403,7 +4403,7 @@
                 <a:latin typeface="Arial" panose="020B0604020202020204" pitchFamily="34" charset="0"/>
                 <a:cs typeface="Arial" panose="020B0604020202020204" pitchFamily="34" charset="0"/>
               </a:rPr>
-              <a:t>Member Accounts</a:t>
+              <a:t>Member accounts</a:t>
             </a:r>
           </a:p>
         </p:txBody>
@@ -4472,7 +4472,7 @@
                 <a:latin typeface="Arial" panose="020B0604020202020204" pitchFamily="34" charset="0"/>
                 <a:cs typeface="Arial" panose="020B0604020202020204" pitchFamily="34" charset="0"/>
               </a:rPr>
-              <a:t>Log Archive Account</a:t>
+              <a:t>Log archive account</a:t>
             </a:r>
           </a:p>
         </p:txBody>
@@ -5717,20 +5717,12 @@
           <a:lstStyle/>
           <a:p>
             <a:r>
-              <a:rPr lang="en-US" sz="900" i="1" dirty="0" err="1">
-                <a:solidFill>
-                  <a:schemeClr val="bg1"/>
-                </a:solidFill>
-              </a:rPr>
-              <a:t>ObjectCreated</a:t>
-            </a:r>
-            <a:r>
               <a:rPr lang="en-US" sz="900" i="1" dirty="0">
                 <a:solidFill>
                   <a:schemeClr val="bg1"/>
                 </a:solidFill>
               </a:rPr>
-              <a:t> Notification</a:t>
+              <a:t>ObjectCreated notification</a:t>
             </a:r>
           </a:p>
         </p:txBody>
@@ -6241,27 +6233,7 @@
                 <a:latin typeface="Courier New" panose="02070309020205020404" pitchFamily="49" charset="0"/>
                 <a:cs typeface="Courier New" panose="02070309020205020404" pitchFamily="49" charset="0"/>
               </a:rPr>
-              <a:t>/</a:t>
-            </a:r>
-            <a:r>
-              <a:rPr lang="en-US" sz="850" b="1" dirty="0" err="1">
-                <a:solidFill>
-                  <a:schemeClr val="bg1"/>
-                </a:solidFill>
-                <a:latin typeface="Courier New" panose="02070309020205020404" pitchFamily="49" charset="0"/>
-                <a:cs typeface="Courier New" panose="02070309020205020404" pitchFamily="49" charset="0"/>
-              </a:rPr>
-              <a:t>AWSLogs</a:t>
-            </a:r>
-            <a:r>
-              <a:rPr lang="en-US" sz="850" b="1" dirty="0">
-                <a:solidFill>
-                  <a:schemeClr val="bg1"/>
-                </a:solidFill>
-                <a:latin typeface="Courier New" panose="02070309020205020404" pitchFamily="49" charset="0"/>
-                <a:cs typeface="Courier New" panose="02070309020205020404" pitchFamily="49" charset="0"/>
-              </a:rPr>
-              <a:t>/&lt;account#&gt;/CloudTrail/&lt;region&gt;/…</a:t>
+              <a:t>/AWSLogs/&lt;account#&gt;/CloudTrail/&lt;region&gt;/…</a:t>
             </a:r>
           </a:p>
         </p:txBody>
@@ -6484,7 +6456,7 @@
                   <a:schemeClr val="bg1"/>
                 </a:solidFill>
               </a:rPr>
-              <a:t>IAM Role for QRadar Suite Principal</a:t>
+              <a:t>IAM role for QRadar suite principal</a:t>
             </a:r>
           </a:p>
         </p:txBody>
@@ -6523,7 +6495,7 @@
                   <a:schemeClr val="bg1"/>
                 </a:solidFill>
               </a:rPr>
-              <a:t>Assume Role</a:t>
+              <a:t>Assume role</a:t>
             </a:r>
           </a:p>
         </p:txBody>
@@ -6562,7 +6534,7 @@
                   <a:schemeClr val="bg1"/>
                 </a:solidFill>
               </a:rPr>
-              <a:t>Process New </a:t>
+              <a:t>Process new </a:t>
             </a:r>
           </a:p>
           <a:p>
@@ -6572,7 +6544,7 @@
                   <a:schemeClr val="bg1"/>
                 </a:solidFill>
               </a:rPr>
-              <a:t>Object Notifications</a:t>
+              <a:t>object notifications</a:t>
             </a:r>
           </a:p>
         </p:txBody>
@@ -6758,20 +6730,12 @@
           <a:lstStyle/>
           <a:p>
             <a:r>
-              <a:rPr lang="en-US" sz="900" i="1" dirty="0" err="1">
-                <a:solidFill>
-                  <a:schemeClr val="bg1"/>
-                </a:solidFill>
-              </a:rPr>
-              <a:t>ObjectCreated</a:t>
-            </a:r>
-            <a:r>
               <a:rPr lang="en-US" sz="900" i="1" dirty="0">
                 <a:solidFill>
                   <a:schemeClr val="bg1"/>
                 </a:solidFill>
               </a:rPr>
-              <a:t> Notification</a:t>
+              <a:t>ObjectCreated notification</a:t>
             </a:r>
           </a:p>
         </p:txBody>
@@ -6810,7 +6774,7 @@
                   <a:schemeClr val="bg1"/>
                 </a:solidFill>
               </a:rPr>
-              <a:t>Guard Duty SQS</a:t>
+              <a:t>GuardDuty SQS</a:t>
             </a:r>
           </a:p>
         </p:txBody>
@@ -6927,47 +6891,7 @@
                 <a:latin typeface="Courier New" panose="02070309020205020404" pitchFamily="49" charset="0"/>
                 <a:cs typeface="Courier New" panose="02070309020205020404" pitchFamily="49" charset="0"/>
               </a:rPr>
-              <a:t>/</a:t>
-            </a:r>
-            <a:r>
-              <a:rPr lang="en-US" sz="850" b="1" dirty="0" err="1">
-                <a:solidFill>
-                  <a:schemeClr val="bg1"/>
-                </a:solidFill>
-                <a:latin typeface="Courier New" panose="02070309020205020404" pitchFamily="49" charset="0"/>
-                <a:cs typeface="Courier New" panose="02070309020205020404" pitchFamily="49" charset="0"/>
-              </a:rPr>
-              <a:t>AWSLogs</a:t>
-            </a:r>
-            <a:r>
-              <a:rPr lang="en-US" sz="850" b="1" dirty="0">
-                <a:solidFill>
-                  <a:schemeClr val="bg1"/>
-                </a:solidFill>
-                <a:latin typeface="Courier New" panose="02070309020205020404" pitchFamily="49" charset="0"/>
-                <a:cs typeface="Courier New" panose="02070309020205020404" pitchFamily="49" charset="0"/>
-              </a:rPr>
-              <a:t>/&lt;account#&gt;/</a:t>
-            </a:r>
-            <a:r>
-              <a:rPr lang="en-US" sz="850" b="1" dirty="0" err="1">
-                <a:solidFill>
-                  <a:schemeClr val="bg1"/>
-                </a:solidFill>
-                <a:latin typeface="Courier New" panose="02070309020205020404" pitchFamily="49" charset="0"/>
-                <a:cs typeface="Courier New" panose="02070309020205020404" pitchFamily="49" charset="0"/>
-              </a:rPr>
-              <a:t>GuardDuty</a:t>
-            </a:r>
-            <a:r>
-              <a:rPr lang="en-US" sz="850" b="1" dirty="0">
-                <a:solidFill>
-                  <a:schemeClr val="bg1"/>
-                </a:solidFill>
-                <a:latin typeface="Courier New" panose="02070309020205020404" pitchFamily="49" charset="0"/>
-                <a:cs typeface="Courier New" panose="02070309020205020404" pitchFamily="49" charset="0"/>
-              </a:rPr>
-              <a:t>/&lt;region&gt;/…</a:t>
+              <a:t>/AWSLogs/&lt;account#&gt;/GuardDuty/&lt;region&gt;/…</a:t>
             </a:r>
           </a:p>
         </p:txBody>
@@ -7167,7 +7091,7 @@
                   <a:schemeClr val="bg1"/>
                 </a:solidFill>
               </a:rPr>
-              <a:t>Get Bucket Objects</a:t>
+              <a:t>Get bucket objects</a:t>
             </a:r>
           </a:p>
           <a:p>
@@ -7177,7 +7101,7 @@
                   <a:schemeClr val="bg1"/>
                 </a:solidFill>
               </a:rPr>
-              <a:t>From Object Notifications and Process Events</a:t>
+              <a:t>from object notifications and process events</a:t>
             </a:r>
           </a:p>
         </p:txBody>
@@ -7408,7 +7332,7 @@
                   <a:schemeClr val="bg1"/>
                 </a:solidFill>
               </a:rPr>
-              <a:t>Repeating Workflow</a:t>
+              <a:t>Repeating workflow</a:t>
             </a:r>
           </a:p>
         </p:txBody>
@@ -7447,7 +7371,7 @@
                   <a:schemeClr val="bg1"/>
                 </a:solidFill>
               </a:rPr>
-              <a:t>Remove Queue Message for Completed Objects</a:t>
+              <a:t>Remove queue message for completed objects</a:t>
             </a:r>
           </a:p>
         </p:txBody>

</xml_diff>